<commit_message>
Cosmetic updates: Properly centred all figures/captions. Added bounding boxes to a couple of figures. Changed typeface for "Drasil" title and authors. Added drop-shadow to the white text throughout. Cleaned up some inconsistent bullets. Added colour-blending to McMaster Logo.
</commit_message>
<xml_diff>
--- a/Dan/CAS Poster Competition/Poster/DrasilPoster.pptx
+++ b/Dan/CAS Poster Competition/Poster/DrasilPoster.pptx
@@ -243,7 +243,7 @@
           <a:p>
             <a:fld id="{78DB94B2-7F19-47C2-AB3F-833F764993AD}" type="datetimeFigureOut">
               <a:rPr lang="en-CA" smtClean="0"/>
-              <a:t>03/04/2017</a:t>
+              <a:t>04/04/2017</a:t>
             </a:fld>
             <a:endParaRPr lang="en-CA"/>
           </a:p>
@@ -413,7 +413,7 @@
           <a:p>
             <a:fld id="{78DB94B2-7F19-47C2-AB3F-833F764993AD}" type="datetimeFigureOut">
               <a:rPr lang="en-CA" smtClean="0"/>
-              <a:t>03/04/2017</a:t>
+              <a:t>04/04/2017</a:t>
             </a:fld>
             <a:endParaRPr lang="en-CA"/>
           </a:p>
@@ -593,7 +593,7 @@
           <a:p>
             <a:fld id="{78DB94B2-7F19-47C2-AB3F-833F764993AD}" type="datetimeFigureOut">
               <a:rPr lang="en-CA" smtClean="0"/>
-              <a:t>03/04/2017</a:t>
+              <a:t>04/04/2017</a:t>
             </a:fld>
             <a:endParaRPr lang="en-CA"/>
           </a:p>
@@ -763,7 +763,7 @@
           <a:p>
             <a:fld id="{78DB94B2-7F19-47C2-AB3F-833F764993AD}" type="datetimeFigureOut">
               <a:rPr lang="en-CA" smtClean="0"/>
-              <a:t>03/04/2017</a:t>
+              <a:t>04/04/2017</a:t>
             </a:fld>
             <a:endParaRPr lang="en-CA"/>
           </a:p>
@@ -1007,7 +1007,7 @@
           <a:p>
             <a:fld id="{78DB94B2-7F19-47C2-AB3F-833F764993AD}" type="datetimeFigureOut">
               <a:rPr lang="en-CA" smtClean="0"/>
-              <a:t>03/04/2017</a:t>
+              <a:t>04/04/2017</a:t>
             </a:fld>
             <a:endParaRPr lang="en-CA"/>
           </a:p>
@@ -1239,7 +1239,7 @@
           <a:p>
             <a:fld id="{78DB94B2-7F19-47C2-AB3F-833F764993AD}" type="datetimeFigureOut">
               <a:rPr lang="en-CA" smtClean="0"/>
-              <a:t>03/04/2017</a:t>
+              <a:t>04/04/2017</a:t>
             </a:fld>
             <a:endParaRPr lang="en-CA"/>
           </a:p>
@@ -1606,7 +1606,7 @@
           <a:p>
             <a:fld id="{78DB94B2-7F19-47C2-AB3F-833F764993AD}" type="datetimeFigureOut">
               <a:rPr lang="en-CA" smtClean="0"/>
-              <a:t>03/04/2017</a:t>
+              <a:t>04/04/2017</a:t>
             </a:fld>
             <a:endParaRPr lang="en-CA"/>
           </a:p>
@@ -1724,7 +1724,7 @@
           <a:p>
             <a:fld id="{78DB94B2-7F19-47C2-AB3F-833F764993AD}" type="datetimeFigureOut">
               <a:rPr lang="en-CA" smtClean="0"/>
-              <a:t>03/04/2017</a:t>
+              <a:t>04/04/2017</a:t>
             </a:fld>
             <a:endParaRPr lang="en-CA"/>
           </a:p>
@@ -1819,7 +1819,7 @@
           <a:p>
             <a:fld id="{78DB94B2-7F19-47C2-AB3F-833F764993AD}" type="datetimeFigureOut">
               <a:rPr lang="en-CA" smtClean="0"/>
-              <a:t>03/04/2017</a:t>
+              <a:t>04/04/2017</a:t>
             </a:fld>
             <a:endParaRPr lang="en-CA"/>
           </a:p>
@@ -2096,7 +2096,7 @@
           <a:p>
             <a:fld id="{78DB94B2-7F19-47C2-AB3F-833F764993AD}" type="datetimeFigureOut">
               <a:rPr lang="en-CA" smtClean="0"/>
-              <a:t>03/04/2017</a:t>
+              <a:t>04/04/2017</a:t>
             </a:fld>
             <a:endParaRPr lang="en-CA"/>
           </a:p>
@@ -2353,7 +2353,7 @@
           <a:p>
             <a:fld id="{78DB94B2-7F19-47C2-AB3F-833F764993AD}" type="datetimeFigureOut">
               <a:rPr lang="en-CA" smtClean="0"/>
-              <a:t>03/04/2017</a:t>
+              <a:t>04/04/2017</a:t>
             </a:fld>
             <a:endParaRPr lang="en-CA"/>
           </a:p>
@@ -2566,7 +2566,7 @@
           <a:p>
             <a:fld id="{78DB94B2-7F19-47C2-AB3F-833F764993AD}" type="datetimeFigureOut">
               <a:rPr lang="en-CA" smtClean="0"/>
-              <a:t>03/04/2017</a:t>
+              <a:t>04/04/2017</a:t>
             </a:fld>
             <a:endParaRPr lang="en-CA"/>
           </a:p>
@@ -3073,7 +3073,7 @@
           <p:nvPr>
             <p:extLst>
               <p:ext uri="{D42A27DB-BD31-4B8C-83A1-F6EECF244321}">
-                <p14:modId xmlns:p14="http://schemas.microsoft.com/office/powerpoint/2010/main" val="1347286397"/>
+                <p14:modId xmlns:p14="http://schemas.microsoft.com/office/powerpoint/2010/main" val="3303684086"/>
               </p:ext>
             </p:extLst>
           </p:nvPr>
@@ -3153,7 +3153,11 @@
                       <a:headEnd type="none" w="med" len="med"/>
                       <a:tailEnd type="none" w="med" len="med"/>
                     </a:lnB>
-                    <a:noFill/>
+                    <a:solidFill>
+                      <a:srgbClr val="808000">
+                        <a:alpha val="20000"/>
+                      </a:srgbClr>
+                    </a:solidFill>
                   </a:tcPr>
                 </a:tc>
                 <a:tc gridSpan="3">
@@ -3163,7 +3167,7 @@
                     <a:p>
                       <a:pPr algn="ctr"/>
                       <a:r>
-                        <a:rPr lang="en-CA" sz="8800" dirty="0" err="1" smtClean="0">
+                        <a:rPr lang="en-CA" sz="8800" dirty="0" smtClean="0">
                           <a:ln w="3175">
                             <a:noFill/>
                           </a:ln>
@@ -3177,7 +3181,7 @@
                               </a:prstClr>
                             </a:outerShdw>
                           </a:effectLst>
-                          <a:latin typeface="+mj-lt"/>
+                          <a:latin typeface="Copperplate Gothic Light" panose="020E0507020206020404" pitchFamily="34" charset="0"/>
                         </a:rPr>
                         <a:t>Drasil</a:t>
                       </a:r>
@@ -3203,101 +3207,22 @@
                     </a:p>
                     <a:p>
                       <a:pPr algn="ctr"/>
-                      <a:r>
-                        <a:rPr lang="en-CA" sz="4000" dirty="0" smtClean="0">
-                          <a:ln w="3175">
-                            <a:noFill/>
-                          </a:ln>
-                          <a:solidFill>
-                            <a:schemeClr val="bg1"/>
-                          </a:solidFill>
-                          <a:effectLst>
-                            <a:outerShdw blurRad="50800" dist="38100" dir="2700000" algn="tl" rotWithShape="0">
-                              <a:prstClr val="black">
-                                <a:alpha val="40000"/>
-                              </a:prstClr>
-                            </a:outerShdw>
-                          </a:effectLst>
-                          <a:latin typeface="+mj-lt"/>
-                        </a:rPr>
-                        <a:t>Dan </a:t>
-                      </a:r>
-                      <a:r>
-                        <a:rPr lang="en-CA" sz="4000" dirty="0" err="1" smtClean="0">
-                          <a:ln w="3175">
-                            <a:noFill/>
-                          </a:ln>
-                          <a:solidFill>
-                            <a:schemeClr val="bg1"/>
-                          </a:solidFill>
-                          <a:effectLst>
-                            <a:outerShdw blurRad="50800" dist="38100" dir="2700000" algn="tl" rotWithShape="0">
-                              <a:prstClr val="black">
-                                <a:alpha val="40000"/>
-                              </a:prstClr>
-                            </a:outerShdw>
-                          </a:effectLst>
-                          <a:latin typeface="+mj-lt"/>
-                        </a:rPr>
-                        <a:t>Szymczak</a:t>
-                      </a:r>
-                      <a:r>
-                        <a:rPr lang="en-CA" sz="4000" dirty="0" smtClean="0">
-                          <a:ln w="3175">
-                            <a:noFill/>
-                          </a:ln>
-                          <a:solidFill>
-                            <a:schemeClr val="bg1"/>
-                          </a:solidFill>
-                          <a:effectLst>
-                            <a:outerShdw blurRad="50800" dist="38100" dir="2700000" algn="tl" rotWithShape="0">
-                              <a:prstClr val="black">
-                                <a:alpha val="40000"/>
-                              </a:prstClr>
-                            </a:outerShdw>
-                          </a:effectLst>
-                          <a:latin typeface="+mj-lt"/>
-                        </a:rPr>
-                        <a:t>, Steven Palmer, Jacques </a:t>
-                      </a:r>
-                      <a:r>
-                        <a:rPr lang="en-CA" sz="4000" dirty="0" err="1" smtClean="0">
-                          <a:ln w="3175">
-                            <a:noFill/>
-                          </a:ln>
-                          <a:solidFill>
-                            <a:schemeClr val="bg1"/>
-                          </a:solidFill>
-                          <a:effectLst>
-                            <a:outerShdw blurRad="50800" dist="38100" dir="2700000" algn="tl" rotWithShape="0">
-                              <a:prstClr val="black">
-                                <a:alpha val="40000"/>
-                              </a:prstClr>
-                            </a:outerShdw>
-                          </a:effectLst>
-                          <a:latin typeface="+mj-lt"/>
-                        </a:rPr>
-                        <a:t>Carette</a:t>
-                      </a:r>
-                      <a:r>
-                        <a:rPr lang="en-CA" sz="4000" dirty="0" smtClean="0">
-                          <a:ln w="3175">
-                            <a:noFill/>
-                          </a:ln>
-                          <a:solidFill>
-                            <a:schemeClr val="bg1"/>
-                          </a:solidFill>
-                          <a:effectLst>
-                            <a:outerShdw blurRad="50800" dist="38100" dir="2700000" algn="tl" rotWithShape="0">
-                              <a:prstClr val="black">
-                                <a:alpha val="40000"/>
-                              </a:prstClr>
-                            </a:outerShdw>
-                          </a:effectLst>
-                          <a:latin typeface="+mj-lt"/>
-                        </a:rPr>
-                        <a:t>, Spencer Smith</a:t>
-                      </a:r>
+                      <a:endParaRPr lang="en-CA" sz="2000" dirty="0" smtClean="0">
+                        <a:ln w="3175">
+                          <a:noFill/>
+                        </a:ln>
+                        <a:solidFill>
+                          <a:schemeClr val="bg1"/>
+                        </a:solidFill>
+                        <a:effectLst>
+                          <a:outerShdw blurRad="50800" dist="38100" dir="2700000" algn="tl" rotWithShape="0">
+                            <a:prstClr val="black">
+                              <a:alpha val="40000"/>
+                            </a:prstClr>
+                          </a:outerShdw>
+                        </a:effectLst>
+                        <a:latin typeface="+mj-lt"/>
+                      </a:endParaRPr>
                     </a:p>
                     <a:p>
                       <a:pPr algn="ctr"/>
@@ -3316,7 +3241,31 @@
                               </a:prstClr>
                             </a:outerShdw>
                           </a:effectLst>
-                          <a:latin typeface="+mj-lt"/>
+                          <a:latin typeface="Times New Roman" panose="02020603050405020304" pitchFamily="18" charset="0"/>
+                          <a:cs typeface="Times New Roman" panose="02020603050405020304" pitchFamily="18" charset="0"/>
+                        </a:rPr>
+                        <a:t>Dan Szymczak, Steven Palmer, Jacques Carette, Spencer Smith</a:t>
+                      </a:r>
+                    </a:p>
+                    <a:p>
+                      <a:pPr algn="ctr"/>
+                      <a:r>
+                        <a:rPr lang="en-CA" sz="4000" dirty="0" smtClean="0">
+                          <a:ln w="3175">
+                            <a:noFill/>
+                          </a:ln>
+                          <a:solidFill>
+                            <a:schemeClr val="bg1"/>
+                          </a:solidFill>
+                          <a:effectLst>
+                            <a:outerShdw blurRad="50800" dist="38100" dir="2700000" algn="tl" rotWithShape="0">
+                              <a:prstClr val="black">
+                                <a:alpha val="40000"/>
+                              </a:prstClr>
+                            </a:outerShdw>
+                          </a:effectLst>
+                          <a:latin typeface="Times New Roman" panose="02020603050405020304" pitchFamily="18" charset="0"/>
+                          <a:cs typeface="Times New Roman" panose="02020603050405020304" pitchFamily="18" charset="0"/>
                         </a:rPr>
                         <a:t>Department of Computing and Software, McMaster</a:t>
                       </a:r>
@@ -3335,7 +3284,8 @@
                               </a:prstClr>
                             </a:outerShdw>
                           </a:effectLst>
-                          <a:latin typeface="+mj-lt"/>
+                          <a:latin typeface="Times New Roman" panose="02020603050405020304" pitchFamily="18" charset="0"/>
+                          <a:cs typeface="Times New Roman" panose="02020603050405020304" pitchFamily="18" charset="0"/>
                         </a:rPr>
                         <a:t> University</a:t>
                       </a:r>
@@ -3353,7 +3303,8 @@
                             </a:prstClr>
                           </a:outerShdw>
                         </a:effectLst>
-                        <a:latin typeface="+mj-lt"/>
+                        <a:latin typeface="Times New Roman" panose="02020603050405020304" pitchFamily="18" charset="0"/>
+                        <a:cs typeface="Times New Roman" panose="02020603050405020304" pitchFamily="18" charset="0"/>
                       </a:endParaRPr>
                     </a:p>
                   </a:txBody>
@@ -3633,7 +3584,13 @@
                           <a:solidFill>
                             <a:schemeClr val="bg1"/>
                           </a:solidFill>
-                          <a:effectLst/>
+                          <a:effectLst>
+                            <a:outerShdw blurRad="50800" dist="38100" dir="2700000" algn="tl" rotWithShape="0">
+                              <a:prstClr val="black">
+                                <a:alpha val="40000"/>
+                              </a:prstClr>
+                            </a:outerShdw>
+                          </a:effectLst>
                         </a:rPr>
                         <a:t>Software artifacts contain a vast amount of knowledge duplication and transformation. A single piece of underlying knowledge should appear (in some form) in every artifact for a given piece of software.</a:t>
                       </a:r>
@@ -3649,7 +3606,13 @@
                         <a:solidFill>
                           <a:schemeClr val="bg1"/>
                         </a:solidFill>
-                        <a:effectLst/>
+                        <a:effectLst>
+                          <a:outerShdw blurRad="50800" dist="38100" dir="2700000" algn="tl" rotWithShape="0">
+                            <a:prstClr val="black">
+                              <a:alpha val="40000"/>
+                            </a:prstClr>
+                          </a:outerShdw>
+                        </a:effectLst>
                       </a:endParaRPr>
                     </a:p>
                     <a:p>
@@ -3663,7 +3626,13 @@
                         <a:solidFill>
                           <a:schemeClr val="bg1"/>
                         </a:solidFill>
-                        <a:effectLst/>
+                        <a:effectLst>
+                          <a:outerShdw blurRad="50800" dist="38100" dir="2700000" algn="tl" rotWithShape="0">
+                            <a:prstClr val="black">
+                              <a:alpha val="40000"/>
+                            </a:prstClr>
+                          </a:outerShdw>
+                        </a:effectLst>
                       </a:endParaRPr>
                     </a:p>
                     <a:p>
@@ -3677,7 +3646,13 @@
                         <a:solidFill>
                           <a:schemeClr val="bg1"/>
                         </a:solidFill>
-                        <a:effectLst/>
+                        <a:effectLst>
+                          <a:outerShdw blurRad="50800" dist="38100" dir="2700000" algn="tl" rotWithShape="0">
+                            <a:prstClr val="black">
+                              <a:alpha val="40000"/>
+                            </a:prstClr>
+                          </a:outerShdw>
+                        </a:effectLst>
                       </a:endParaRPr>
                     </a:p>
                     <a:p>
@@ -3691,7 +3666,13 @@
                         <a:solidFill>
                           <a:schemeClr val="bg1"/>
                         </a:solidFill>
-                        <a:effectLst/>
+                        <a:effectLst>
+                          <a:outerShdw blurRad="50800" dist="38100" dir="2700000" algn="tl" rotWithShape="0">
+                            <a:prstClr val="black">
+                              <a:alpha val="40000"/>
+                            </a:prstClr>
+                          </a:outerShdw>
+                        </a:effectLst>
                       </a:endParaRPr>
                     </a:p>
                     <a:p>
@@ -3705,7 +3686,13 @@
                         <a:solidFill>
                           <a:schemeClr val="bg1"/>
                         </a:solidFill>
-                        <a:effectLst/>
+                        <a:effectLst>
+                          <a:outerShdw blurRad="50800" dist="38100" dir="2700000" algn="tl" rotWithShape="0">
+                            <a:prstClr val="black">
+                              <a:alpha val="40000"/>
+                            </a:prstClr>
+                          </a:outerShdw>
+                        </a:effectLst>
                       </a:endParaRPr>
                     </a:p>
                     <a:p>
@@ -3719,7 +3706,13 @@
                         <a:solidFill>
                           <a:schemeClr val="bg1"/>
                         </a:solidFill>
-                        <a:effectLst/>
+                        <a:effectLst>
+                          <a:outerShdw blurRad="50800" dist="38100" dir="2700000" algn="tl" rotWithShape="0">
+                            <a:prstClr val="black">
+                              <a:alpha val="40000"/>
+                            </a:prstClr>
+                          </a:outerShdw>
+                        </a:effectLst>
                       </a:endParaRPr>
                     </a:p>
                     <a:p>
@@ -3733,7 +3726,13 @@
                         <a:solidFill>
                           <a:schemeClr val="bg1"/>
                         </a:solidFill>
-                        <a:effectLst/>
+                        <a:effectLst>
+                          <a:outerShdw blurRad="50800" dist="38100" dir="2700000" algn="tl" rotWithShape="0">
+                            <a:prstClr val="black">
+                              <a:alpha val="40000"/>
+                            </a:prstClr>
+                          </a:outerShdw>
+                        </a:effectLst>
                       </a:endParaRPr>
                     </a:p>
                     <a:p>
@@ -3747,7 +3746,13 @@
                         <a:solidFill>
                           <a:schemeClr val="bg1"/>
                         </a:solidFill>
-                        <a:effectLst/>
+                        <a:effectLst>
+                          <a:outerShdw blurRad="50800" dist="38100" dir="2700000" algn="tl" rotWithShape="0">
+                            <a:prstClr val="black">
+                              <a:alpha val="40000"/>
+                            </a:prstClr>
+                          </a:outerShdw>
+                        </a:effectLst>
                       </a:endParaRPr>
                     </a:p>
                     <a:p>
@@ -3761,7 +3766,13 @@
                         <a:solidFill>
                           <a:schemeClr val="bg1"/>
                         </a:solidFill>
-                        <a:effectLst/>
+                        <a:effectLst>
+                          <a:outerShdw blurRad="50800" dist="38100" dir="2700000" algn="tl" rotWithShape="0">
+                            <a:prstClr val="black">
+                              <a:alpha val="40000"/>
+                            </a:prstClr>
+                          </a:outerShdw>
+                        </a:effectLst>
                       </a:endParaRPr>
                     </a:p>
                     <a:p>
@@ -3775,7 +3786,13 @@
                         <a:solidFill>
                           <a:schemeClr val="bg1"/>
                         </a:solidFill>
-                        <a:effectLst/>
+                        <a:effectLst>
+                          <a:outerShdw blurRad="50800" dist="38100" dir="2700000" algn="tl" rotWithShape="0">
+                            <a:prstClr val="black">
+                              <a:alpha val="40000"/>
+                            </a:prstClr>
+                          </a:outerShdw>
+                        </a:effectLst>
                       </a:endParaRPr>
                     </a:p>
                     <a:p>
@@ -3789,7 +3806,13 @@
                         <a:solidFill>
                           <a:schemeClr val="bg1"/>
                         </a:solidFill>
-                        <a:effectLst/>
+                        <a:effectLst>
+                          <a:outerShdw blurRad="50800" dist="38100" dir="2700000" algn="tl" rotWithShape="0">
+                            <a:prstClr val="black">
+                              <a:alpha val="40000"/>
+                            </a:prstClr>
+                          </a:outerShdw>
+                        </a:effectLst>
                       </a:endParaRPr>
                     </a:p>
                     <a:p>
@@ -3803,7 +3826,13 @@
                         <a:solidFill>
                           <a:schemeClr val="bg1"/>
                         </a:solidFill>
-                        <a:effectLst/>
+                        <a:effectLst>
+                          <a:outerShdw blurRad="50800" dist="38100" dir="2700000" algn="tl" rotWithShape="0">
+                            <a:prstClr val="black">
+                              <a:alpha val="40000"/>
+                            </a:prstClr>
+                          </a:outerShdw>
+                        </a:effectLst>
                       </a:endParaRPr>
                     </a:p>
                     <a:p>
@@ -3817,7 +3846,13 @@
                         <a:solidFill>
                           <a:schemeClr val="bg1"/>
                         </a:solidFill>
-                        <a:effectLst/>
+                        <a:effectLst>
+                          <a:outerShdw blurRad="50800" dist="38100" dir="2700000" algn="tl" rotWithShape="0">
+                            <a:prstClr val="black">
+                              <a:alpha val="40000"/>
+                            </a:prstClr>
+                          </a:outerShdw>
+                        </a:effectLst>
                       </a:endParaRPr>
                     </a:p>
                     <a:p>
@@ -3831,7 +3866,13 @@
                         <a:solidFill>
                           <a:schemeClr val="bg1"/>
                         </a:solidFill>
-                        <a:effectLst/>
+                        <a:effectLst>
+                          <a:outerShdw blurRad="50800" dist="38100" dir="2700000" algn="tl" rotWithShape="0">
+                            <a:prstClr val="black">
+                              <a:alpha val="40000"/>
+                            </a:prstClr>
+                          </a:outerShdw>
+                        </a:effectLst>
                       </a:endParaRPr>
                     </a:p>
                     <a:p>
@@ -3846,7 +3887,13 @@
                           <a:solidFill>
                             <a:schemeClr val="bg1"/>
                           </a:solidFill>
-                          <a:effectLst/>
+                          <a:effectLst>
+                            <a:outerShdw blurRad="50800" dist="38100" dir="2700000" algn="tl" rotWithShape="0">
+                              <a:prstClr val="black">
+                                <a:alpha val="40000"/>
+                              </a:prstClr>
+                            </a:outerShdw>
+                          </a:effectLst>
                         </a:rPr>
                         <a:t>In certain domains, like Scientific Computing, knowledge is duplicated across many different pieces of software. This duplication is almost exclusively performed manually, whether by copying/pasting from existing artifacts, or by transcription from another source such as a textbook.</a:t>
                       </a:r>
@@ -3863,7 +3910,13 @@
                           <a:solidFill>
                             <a:schemeClr val="bg1"/>
                           </a:solidFill>
-                          <a:effectLst/>
+                          <a:effectLst>
+                            <a:outerShdw blurRad="50800" dist="38100" dir="2700000" algn="tl" rotWithShape="0">
+                              <a:prstClr val="black">
+                                <a:alpha val="40000"/>
+                              </a:prstClr>
+                            </a:outerShdw>
+                          </a:effectLst>
                         </a:rPr>
                         <a:t>Artifacts tend to fall out of sync as the software is updated (especially code versus documentation), negatively impacting the overall software quality. This is most noticeable when it comes to maintainability, traceability, and verifiability.</a:t>
                       </a:r>
@@ -3920,19 +3973,15 @@
                           <a:solidFill>
                             <a:schemeClr val="bg1"/>
                           </a:solidFill>
+                          <a:effectLst>
+                            <a:outerShdw blurRad="50800" dist="38100" dir="2700000" algn="tl" rotWithShape="0">
+                              <a:prstClr val="black">
+                                <a:alpha val="40000"/>
+                              </a:prstClr>
+                            </a:outerShdw>
+                          </a:effectLst>
                         </a:rPr>
-                        <a:t>Dan </a:t>
-                      </a:r>
-                      <a:r>
-                        <a:rPr lang="en-CA" sz="3200" dirty="0" err="1" smtClean="0">
-                          <a:ln w="3175">
-                            <a:noFill/>
-                          </a:ln>
-                          <a:solidFill>
-                            <a:schemeClr val="bg1"/>
-                          </a:solidFill>
-                        </a:rPr>
-                        <a:t>Szymczak</a:t>
+                        <a:t>Dan Szymczak:</a:t>
                       </a:r>
                       <a:r>
                         <a:rPr lang="en-CA" sz="3200" dirty="0" smtClean="0">
@@ -3943,7 +3992,7 @@
                             <a:schemeClr val="bg1"/>
                           </a:solidFill>
                         </a:rPr>
-                        <a:t>: </a:t>
+                        <a:t> </a:t>
                       </a:r>
                       <a:r>
                         <a:rPr lang="en-CA" sz="3200" dirty="0" smtClean="0">
@@ -4636,33 +4685,7 @@
                             </a:schemeClr>
                           </a:solidFill>
                         </a:rPr>
-                        <a:t>(</a:t>
-                      </a:r>
-                      <a:r>
-                        <a:rPr lang="en-CA" sz="2400" i="1" dirty="0" err="1" smtClean="0">
-                          <a:ln w="3175">
-                            <a:noFill/>
-                          </a:ln>
-                          <a:solidFill>
-                            <a:schemeClr val="accent6">
-                              <a:lumMod val="50000"/>
-                            </a:schemeClr>
-                          </a:solidFill>
-                        </a:rPr>
-                        <a:t>Parnas</a:t>
-                      </a:r>
-                      <a:r>
-                        <a:rPr lang="en-CA" sz="2400" i="1" dirty="0" smtClean="0">
-                          <a:ln w="3175">
-                            <a:noFill/>
-                          </a:ln>
-                          <a:solidFill>
-                            <a:schemeClr val="accent6">
-                              <a:lumMod val="50000"/>
-                            </a:schemeClr>
-                          </a:solidFill>
-                        </a:rPr>
-                        <a:t> &amp; Clements 1986)</a:t>
+                        <a:t>(Parnas &amp; Clements 1986)</a:t>
                       </a:r>
                     </a:p>
                     <a:p>
@@ -4851,44 +4874,8 @@
                             </a:schemeClr>
                           </a:solidFill>
                         </a:rPr>
-                        <a:t>The </a:t>
+                        <a:t>The Drasil Framework</a:t>
                       </a:r>
-                      <a:r>
-                        <a:rPr lang="en-CA" sz="2400" dirty="0" err="1" smtClean="0">
-                          <a:ln w="3175">
-                            <a:noFill/>
-                          </a:ln>
-                          <a:solidFill>
-                            <a:schemeClr val="accent6">
-                              <a:lumMod val="50000"/>
-                            </a:schemeClr>
-                          </a:solidFill>
-                        </a:rPr>
-                        <a:t>Drasil</a:t>
-                      </a:r>
-                      <a:r>
-                        <a:rPr lang="en-CA" sz="2400" smtClean="0">
-                          <a:ln w="3175">
-                            <a:noFill/>
-                          </a:ln>
-                          <a:solidFill>
-                            <a:schemeClr val="accent6">
-                              <a:lumMod val="50000"/>
-                            </a:schemeClr>
-                          </a:solidFill>
-                        </a:rPr>
-                        <a:t> Framework</a:t>
-                      </a:r>
-                      <a:endParaRPr lang="en-CA" sz="2400" dirty="0" smtClean="0">
-                        <a:ln w="3175">
-                          <a:noFill/>
-                        </a:ln>
-                        <a:solidFill>
-                          <a:schemeClr val="accent6">
-                            <a:lumMod val="50000"/>
-                          </a:schemeClr>
-                        </a:solidFill>
-                      </a:endParaRPr>
                     </a:p>
                     <a:p>
                       <a:pPr marL="519113" indent="-342900" algn="l">
@@ -5227,7 +5214,7 @@
                       </a:endParaRPr>
                     </a:p>
                     <a:p>
-                      <a:pPr marL="0" indent="0" algn="l">
+                      <a:pPr marL="0" indent="0" algn="just">
                         <a:buFont typeface="+mj-lt"/>
                         <a:buNone/>
                       </a:pPr>
@@ -5629,30 +5616,11 @@
                         </a:spcAft>
                         <a:buClrTx/>
                         <a:buSzTx/>
-                        <a:buFont typeface="Arial" panose="020B0604020202020204" pitchFamily="34" charset="0"/>
-                        <a:buChar char="•"/>
+                        <a:buFont typeface="Wingdings" panose="05000000000000000000" pitchFamily="2" charset="2"/>
+                        <a:buChar char="v"/>
                         <a:tabLst/>
                         <a:defRPr/>
                       </a:pPr>
-                      <a:r>
-                        <a:rPr kumimoji="0" lang="en-CA" sz="2400" b="0" i="0" u="none" strike="noStrike" kern="1200" cap="none" spc="0" normalizeH="0" baseline="0" noProof="0" dirty="0" err="1" smtClean="0">
-                          <a:ln w="3175">
-                            <a:noFill/>
-                          </a:ln>
-                          <a:solidFill>
-                            <a:srgbClr val="70AD47">
-                              <a:lumMod val="50000"/>
-                            </a:srgbClr>
-                          </a:solidFill>
-                          <a:effectLst/>
-                          <a:uLnTx/>
-                          <a:uFillTx/>
-                          <a:latin typeface="+mn-lt"/>
-                          <a:ea typeface="+mn-ea"/>
-                          <a:cs typeface="+mn-cs"/>
-                        </a:rPr>
-                        <a:t>Drasil</a:t>
-                      </a:r>
                       <a:r>
                         <a:rPr kumimoji="0" lang="en-CA" sz="2400" b="0" i="0" u="none" strike="noStrike" kern="1200" cap="none" spc="0" normalizeH="0" baseline="0" noProof="0" dirty="0" smtClean="0">
                           <a:ln w="3175">
@@ -5670,7 +5638,7 @@
                           <a:ea typeface="+mn-ea"/>
                           <a:cs typeface="+mn-cs"/>
                         </a:rPr>
-                        <a:t> is being developed through rapid iteration using a practical, example-driven approach</a:t>
+                        <a:t>Drasil is being developed through rapid iteration using a practical, example-driven approach</a:t>
                       </a:r>
                     </a:p>
                     <a:p>
@@ -5686,30 +5654,11 @@
                         </a:spcAft>
                         <a:buClrTx/>
                         <a:buSzTx/>
-                        <a:buFont typeface="Arial" panose="020B0604020202020204" pitchFamily="34" charset="0"/>
-                        <a:buChar char="•"/>
+                        <a:buFont typeface="Wingdings" panose="05000000000000000000" pitchFamily="2" charset="2"/>
+                        <a:buChar char="v"/>
                         <a:tabLst/>
                         <a:defRPr/>
                       </a:pPr>
-                      <a:r>
-                        <a:rPr kumimoji="0" lang="en-CA" sz="2400" b="0" i="0" u="none" strike="noStrike" kern="1200" cap="none" spc="0" normalizeH="0" baseline="0" noProof="0" dirty="0" err="1" smtClean="0">
-                          <a:ln w="3175">
-                            <a:noFill/>
-                          </a:ln>
-                          <a:solidFill>
-                            <a:srgbClr val="70AD47">
-                              <a:lumMod val="50000"/>
-                            </a:srgbClr>
-                          </a:solidFill>
-                          <a:effectLst/>
-                          <a:uLnTx/>
-                          <a:uFillTx/>
-                          <a:latin typeface="+mn-lt"/>
-                          <a:ea typeface="+mn-ea"/>
-                          <a:cs typeface="+mn-cs"/>
-                        </a:rPr>
-                        <a:t>Drasil</a:t>
-                      </a:r>
                       <a:r>
                         <a:rPr kumimoji="0" lang="en-CA" sz="2400" b="0" i="0" u="none" strike="noStrike" kern="1200" cap="none" spc="0" normalizeH="0" baseline="0" noProof="0" dirty="0" smtClean="0">
                           <a:ln w="3175">
@@ -5727,7 +5676,7 @@
                           <a:ea typeface="+mn-ea"/>
                           <a:cs typeface="+mn-cs"/>
                         </a:rPr>
-                        <a:t> is composed of a number of Domain-Specific Languages (DSLs) embedded in Haskell</a:t>
+                        <a:t>Drasil is composed of a number of Domain-Specific Languages (DSLs) embedded in Haskell</a:t>
                       </a:r>
                     </a:p>
                   </a:txBody>
@@ -6251,35 +6200,7 @@
                           </a:solidFill>
                           <a:latin typeface="+mn-lt"/>
                         </a:rPr>
-                        <a:t>Incorporation of GOOL allows </a:t>
-                      </a:r>
-                      <a:r>
-                        <a:rPr lang="en-CA" sz="2400" b="0" dirty="0" err="1" smtClean="0">
-                          <a:ln w="3175">
-                            <a:noFill/>
-                          </a:ln>
-                          <a:solidFill>
-                            <a:schemeClr val="accent6">
-                              <a:lumMod val="50000"/>
-                            </a:schemeClr>
-                          </a:solidFill>
-                          <a:latin typeface="+mn-lt"/>
-                        </a:rPr>
-                        <a:t>Drasil</a:t>
-                      </a:r>
-                      <a:r>
-                        <a:rPr lang="en-CA" sz="2400" b="0" dirty="0" smtClean="0">
-                          <a:ln w="3175">
-                            <a:noFill/>
-                          </a:ln>
-                          <a:solidFill>
-                            <a:schemeClr val="accent6">
-                              <a:lumMod val="50000"/>
-                            </a:schemeClr>
-                          </a:solidFill>
-                          <a:latin typeface="+mn-lt"/>
-                        </a:rPr>
-                        <a:t> to generate</a:t>
+                        <a:t>Incorporation of GOOL allows Drasil to generate</a:t>
                       </a:r>
                       <a:r>
                         <a:rPr lang="en-CA" sz="2400" b="0" baseline="0" dirty="0" smtClean="0">
@@ -6386,20 +6307,6 @@
                     <a:p>
                       <a:pPr algn="just"/>
                       <a:r>
-                        <a:rPr lang="en-CA" sz="2400" b="0" baseline="0" dirty="0" err="1" smtClean="0">
-                          <a:ln w="3175">
-                            <a:noFill/>
-                          </a:ln>
-                          <a:solidFill>
-                            <a:schemeClr val="accent6">
-                              <a:lumMod val="50000"/>
-                            </a:schemeClr>
-                          </a:solidFill>
-                          <a:latin typeface="+mn-lt"/>
-                        </a:rPr>
-                        <a:t>Drasil</a:t>
-                      </a:r>
-                      <a:r>
                         <a:rPr lang="en-CA" sz="2400" b="0" baseline="0" dirty="0" smtClean="0">
                           <a:ln w="3175">
                             <a:noFill/>
@@ -6411,35 +6318,7 @@
                           </a:solidFill>
                           <a:latin typeface="+mn-lt"/>
                         </a:rPr>
-                        <a:t> currently outputs documents to </a:t>
-                      </a:r>
-                      <a:r>
-                        <a:rPr lang="en-CA" sz="2400" b="0" baseline="0" dirty="0" err="1" smtClean="0">
-                          <a:ln w="3175">
-                            <a:noFill/>
-                          </a:ln>
-                          <a:solidFill>
-                            <a:schemeClr val="accent6">
-                              <a:lumMod val="50000"/>
-                            </a:schemeClr>
-                          </a:solidFill>
-                          <a:latin typeface="+mn-lt"/>
-                        </a:rPr>
-                        <a:t>TeX</a:t>
-                      </a:r>
-                      <a:r>
-                        <a:rPr lang="en-CA" sz="2400" b="0" baseline="0" dirty="0" smtClean="0">
-                          <a:ln w="3175">
-                            <a:noFill/>
-                          </a:ln>
-                          <a:solidFill>
-                            <a:schemeClr val="accent6">
-                              <a:lumMod val="50000"/>
-                            </a:schemeClr>
-                          </a:solidFill>
-                          <a:latin typeface="+mn-lt"/>
-                        </a:rPr>
-                        <a:t> and HTML formats. Our abstract recipes allow us to change formats on the fly, or  produce versions in multiple formats simultaneously.</a:t>
+                        <a:t>Drasil currently outputs documents to TeX and HTML formats. Our abstract recipes allow us to change formats on the fly, or  produce versions in multiple formats simultaneously.</a:t>
                       </a:r>
                     </a:p>
                     <a:p>
@@ -6713,8 +6592,8 @@
         </p:blipFill>
         <p:spPr>
           <a:xfrm>
-            <a:off x="1696700" y="6172496"/>
-            <a:ext cx="4921110" cy="3493988"/>
+            <a:off x="1645920" y="6172496"/>
+            <a:ext cx="4937760" cy="3505809"/>
           </a:xfrm>
           <a:prstGeom prst="rect">
             <a:avLst/>
@@ -6743,8 +6622,8 @@
         </p:blipFill>
         <p:spPr>
           <a:xfrm>
-            <a:off x="1323882" y="12252961"/>
-            <a:ext cx="5919473" cy="4283485"/>
+            <a:off x="1143000" y="12252960"/>
+            <a:ext cx="5943600" cy="4300944"/>
           </a:xfrm>
           <a:prstGeom prst="rect">
             <a:avLst/>
@@ -6759,10 +6638,10 @@
         </p:nvGrpSpPr>
         <p:grpSpPr>
           <a:xfrm>
-            <a:off x="8818329" y="5590235"/>
-            <a:ext cx="7170610" cy="4563475"/>
-            <a:chOff x="8818329" y="5590235"/>
-            <a:chExt cx="7170610" cy="4563475"/>
+            <a:off x="8759952" y="5577840"/>
+            <a:ext cx="7178040" cy="4606350"/>
+            <a:chOff x="8759952" y="5577840"/>
+            <a:chExt cx="7178040" cy="4606350"/>
           </a:xfrm>
         </p:grpSpPr>
         <p:pic>
@@ -6787,12 +6666,17 @@
           </p:blipFill>
           <p:spPr>
             <a:xfrm>
-              <a:off x="8818329" y="5590235"/>
-              <a:ext cx="7170610" cy="4102375"/>
+              <a:off x="8759952" y="5577840"/>
+              <a:ext cx="7178040" cy="4106626"/>
             </a:xfrm>
             <a:prstGeom prst="rect">
               <a:avLst/>
             </a:prstGeom>
+            <a:ln w="12700">
+              <a:solidFill>
+                <a:srgbClr val="006600"/>
+              </a:solidFill>
+            </a:ln>
           </p:spPr>
         </p:pic>
         <p:sp>
@@ -6803,13 +6687,16 @@
           </p:nvSpPr>
           <p:spPr>
             <a:xfrm>
-              <a:off x="9303657" y="9753600"/>
+              <a:off x="9326880" y="9784080"/>
               <a:ext cx="6037943" cy="400110"/>
             </a:xfrm>
             <a:prstGeom prst="rect">
               <a:avLst/>
             </a:prstGeom>
             <a:noFill/>
+            <a:ln>
+              <a:noFill/>
+            </a:ln>
           </p:spPr>
           <p:txBody>
             <a:bodyPr wrap="square" rtlCol="0">
@@ -6847,10 +6734,10 @@
         </p:nvGrpSpPr>
         <p:grpSpPr>
           <a:xfrm>
-            <a:off x="17621557" y="10579798"/>
-            <a:ext cx="5965725" cy="8456915"/>
-            <a:chOff x="17608731" y="6170245"/>
-            <a:chExt cx="5965725" cy="8456915"/>
+            <a:off x="17556480" y="10469880"/>
+            <a:ext cx="6035040" cy="8559463"/>
+            <a:chOff x="17543654" y="6060327"/>
+            <a:chExt cx="6035040" cy="8559463"/>
           </a:xfrm>
         </p:grpSpPr>
         <p:grpSp>
@@ -6861,10 +6748,10 @@
           </p:nvGrpSpPr>
           <p:grpSpPr>
             <a:xfrm>
-              <a:off x="17608731" y="6170245"/>
-              <a:ext cx="5965725" cy="7362875"/>
-              <a:chOff x="17608731" y="6170245"/>
-              <a:chExt cx="5965725" cy="7362875"/>
+              <a:off x="17543654" y="6060327"/>
+              <a:ext cx="6035040" cy="7452360"/>
+              <a:chOff x="17543654" y="6060327"/>
+              <a:chExt cx="6035040" cy="7452360"/>
             </a:xfrm>
           </p:grpSpPr>
           <p:sp>
@@ -6875,8 +6762,8 @@
             </p:nvSpPr>
             <p:spPr>
               <a:xfrm>
-                <a:off x="17608731" y="6172527"/>
-                <a:ext cx="5956663" cy="7360593"/>
+                <a:off x="17543654" y="6060327"/>
+                <a:ext cx="6035040" cy="7452360"/>
               </a:xfrm>
               <a:prstGeom prst="rect">
                 <a:avLst/>
@@ -6887,6 +6774,11 @@
                   <a:lumOff val="60000"/>
                 </a:schemeClr>
               </a:solidFill>
+              <a:ln>
+                <a:solidFill>
+                  <a:srgbClr val="006600"/>
+                </a:solidFill>
+              </a:ln>
             </p:spPr>
             <p:style>
               <a:lnRef idx="2">
@@ -6935,7 +6827,7 @@
             </p:blipFill>
             <p:spPr>
               <a:xfrm>
-                <a:off x="17630856" y="6170245"/>
+                <a:off x="17589374" y="6106047"/>
                 <a:ext cx="5943600" cy="7362875"/>
               </a:xfrm>
               <a:prstGeom prst="rect">
@@ -6952,7 +6844,7 @@
           </p:nvSpPr>
           <p:spPr>
             <a:xfrm>
-              <a:off x="18027447" y="13611497"/>
+              <a:off x="17918558" y="13604127"/>
               <a:ext cx="5271218" cy="1015663"/>
             </a:xfrm>
             <a:prstGeom prst="rect">
@@ -6996,10 +6888,10 @@
         </p:nvGrpSpPr>
         <p:grpSpPr>
           <a:xfrm>
-            <a:off x="26609040" y="6836063"/>
-            <a:ext cx="4389120" cy="4510879"/>
-            <a:chOff x="18426790" y="16009128"/>
-            <a:chExt cx="4389120" cy="4510879"/>
+            <a:off x="26709624" y="6812280"/>
+            <a:ext cx="4453128" cy="4560630"/>
+            <a:chOff x="18527374" y="15985345"/>
+            <a:chExt cx="4453128" cy="4560630"/>
           </a:xfrm>
         </p:grpSpPr>
         <p:sp>
@@ -7010,8 +6902,8 @@
           </p:nvSpPr>
           <p:spPr>
             <a:xfrm>
-              <a:off x="18426790" y="16009128"/>
-              <a:ext cx="4389120" cy="4114800"/>
+              <a:off x="18527374" y="15985345"/>
+              <a:ext cx="4453128" cy="4187952"/>
             </a:xfrm>
             <a:prstGeom prst="rect">
               <a:avLst/>
@@ -7022,6 +6914,11 @@
                 <a:lumOff val="80000"/>
               </a:schemeClr>
             </a:solidFill>
+            <a:ln>
+              <a:solidFill>
+                <a:srgbClr val="006600"/>
+              </a:solidFill>
+            </a:ln>
           </p:spPr>
           <p:style>
             <a:lnRef idx="2">
@@ -7070,7 +6967,7 @@
           </p:blipFill>
           <p:spPr>
             <a:xfrm>
-              <a:off x="18443859" y="16022119"/>
+              <a:off x="18573094" y="16031065"/>
               <a:ext cx="4364444" cy="4097778"/>
             </a:xfrm>
             <a:prstGeom prst="rect">
@@ -7086,7 +6983,7 @@
           </p:nvSpPr>
           <p:spPr>
             <a:xfrm>
-              <a:off x="18608040" y="20119897"/>
+              <a:off x="18637102" y="20145865"/>
               <a:ext cx="3970020" cy="400110"/>
             </a:xfrm>
             <a:prstGeom prst="rect">
@@ -7206,7 +7103,7 @@
               <a:buChar char="v"/>
             </a:pPr>
             <a:r>
-              <a:rPr lang="en-CA" sz="2400" dirty="0" err="1">
+              <a:rPr lang="en-CA" sz="2400" dirty="0">
                 <a:ln w="3175">
                   <a:noFill/>
                 </a:ln>
@@ -7218,16 +7115,6 @@
               </a:rPr>
               <a:t>Lua</a:t>
             </a:r>
-            <a:endParaRPr lang="en-CA" sz="2400" dirty="0">
-              <a:ln w="3175">
-                <a:noFill/>
-              </a:ln>
-              <a:solidFill>
-                <a:srgbClr val="70AD47">
-                  <a:lumMod val="50000"/>
-                </a:srgbClr>
-              </a:solidFill>
-            </a:endParaRPr>
           </a:p>
           <a:p>
             <a:pPr marL="342900" lvl="0" indent="-342900" defTabSz="2926080">
@@ -7278,10 +7165,10 @@
         </p:nvGrpSpPr>
         <p:grpSpPr>
           <a:xfrm>
-            <a:off x="10091694" y="15870889"/>
-            <a:ext cx="4623879" cy="3987147"/>
-            <a:chOff x="10091694" y="15870889"/>
-            <a:chExt cx="4623879" cy="3987147"/>
+            <a:off x="10040112" y="15910560"/>
+            <a:ext cx="4617720" cy="4136886"/>
+            <a:chOff x="10040112" y="15910560"/>
+            <a:chExt cx="4617720" cy="4136886"/>
           </a:xfrm>
         </p:grpSpPr>
         <p:pic>
@@ -7306,12 +7193,17 @@
           </p:blipFill>
           <p:spPr>
             <a:xfrm>
-              <a:off x="10091694" y="15870889"/>
-              <a:ext cx="4623879" cy="3437083"/>
+              <a:off x="10040112" y="15910560"/>
+              <a:ext cx="4617720" cy="3432505"/>
             </a:xfrm>
             <a:prstGeom prst="rect">
               <a:avLst/>
             </a:prstGeom>
+            <a:ln w="12700">
+              <a:solidFill>
+                <a:srgbClr val="006600"/>
+              </a:solidFill>
+            </a:ln>
           </p:spPr>
         </p:pic>
         <p:sp>
@@ -7322,8 +7214,8 @@
           </p:nvSpPr>
           <p:spPr>
             <a:xfrm>
-              <a:off x="10711543" y="19150150"/>
-              <a:ext cx="3479732" cy="707886"/>
+              <a:off x="10607040" y="19339560"/>
+              <a:ext cx="3474720" cy="707886"/>
             </a:xfrm>
             <a:prstGeom prst="rect">
               <a:avLst/>
@@ -7345,17 +7237,7 @@
                     </a:schemeClr>
                   </a:solidFill>
                 </a:rPr>
-                <a:t>Figure 2: Knowledge Capture is necessary with </a:t>
-              </a:r>
-              <a:r>
-                <a:rPr lang="en-CA" sz="2000" dirty="0" err="1" smtClean="0">
-                  <a:solidFill>
-                    <a:schemeClr val="accent6">
-                      <a:lumMod val="75000"/>
-                    </a:schemeClr>
-                  </a:solidFill>
-                </a:rPr>
-                <a:t>Drasil</a:t>
+                <a:t>Figure 2: Knowledge Capture is necessary with Drasil</a:t>
               </a:r>
               <a:endParaRPr lang="en-CA" sz="2000" dirty="0">
                 <a:solidFill>

</xml_diff>

<commit_message>
Lighten bg beige and change some font-faces and intensities.
</commit_message>
<xml_diff>
--- a/Dan/CAS Poster Competition/Poster/DrasilPoster.pptx
+++ b/Dan/CAS Poster Competition/Poster/DrasilPoster.pptx
@@ -3073,7 +3073,7 @@
           <p:nvPr>
             <p:extLst>
               <p:ext uri="{D42A27DB-BD31-4B8C-83A1-F6EECF244321}">
-                <p14:modId xmlns:p14="http://schemas.microsoft.com/office/powerpoint/2010/main" val="3303684086"/>
+                <p14:modId xmlns:p14="http://schemas.microsoft.com/office/powerpoint/2010/main" val="2606549382"/>
               </p:ext>
             </p:extLst>
           </p:nvPr>
@@ -3154,7 +3154,7 @@
                       <a:tailEnd type="none" w="med" len="med"/>
                     </a:lnB>
                     <a:solidFill>
-                      <a:srgbClr val="808000">
+                      <a:srgbClr val="CCCC00">
                         <a:alpha val="20000"/>
                       </a:srgbClr>
                     </a:solidFill>
@@ -3396,7 +3396,8 @@
                               </a:prstClr>
                             </a:outerShdw>
                           </a:effectLst>
-                          <a:latin typeface="+mj-lt"/>
+                          <a:latin typeface="Aharoni" panose="02010803020104030203" pitchFamily="2" charset="-79"/>
+                          <a:cs typeface="Aharoni" panose="02010803020104030203" pitchFamily="2" charset="-79"/>
                         </a:rPr>
                         <a:t>Sick of out of sync </a:t>
                       </a:r>
@@ -3420,7 +3421,8 @@
                               </a:prstClr>
                             </a:outerShdw>
                           </a:effectLst>
-                          <a:latin typeface="+mj-lt"/>
+                          <a:latin typeface="Aharoni" panose="02010803020104030203" pitchFamily="2" charset="-79"/>
+                          <a:cs typeface="Aharoni" panose="02010803020104030203" pitchFamily="2" charset="-79"/>
                         </a:rPr>
                         <a:t>Software Artifacts</a:t>
                       </a:r>
@@ -3439,7 +3441,8 @@
                               </a:prstClr>
                             </a:outerShdw>
                           </a:effectLst>
-                          <a:latin typeface="+mj-lt"/>
+                          <a:latin typeface="Aharoni" panose="02010803020104030203" pitchFamily="2" charset="-79"/>
+                          <a:cs typeface="Aharoni" panose="02010803020104030203" pitchFamily="2" charset="-79"/>
                         </a:rPr>
                         <a:t>?</a:t>
                       </a:r>
@@ -3567,7 +3570,8 @@
                               </a:prstClr>
                             </a:outerShdw>
                           </a:effectLst>
-                          <a:latin typeface="+mj-lt"/>
+                          <a:latin typeface="Aharoni" panose="02010803020104030203" pitchFamily="2" charset="-79"/>
+                          <a:cs typeface="Aharoni" panose="02010803020104030203" pitchFamily="2" charset="-79"/>
                         </a:rPr>
                         <a:t>Research Problem</a:t>
                       </a:r>
@@ -3940,7 +3944,8 @@
                               </a:prstClr>
                             </a:outerShdw>
                           </a:effectLst>
-                          <a:latin typeface="+mj-lt"/>
+                          <a:latin typeface="Aharoni" panose="02010803020104030203" pitchFamily="2" charset="-79"/>
+                          <a:cs typeface="Aharoni" panose="02010803020104030203" pitchFamily="2" charset="-79"/>
                         </a:rPr>
                         <a:t>Contact</a:t>
                       </a:r>
@@ -3958,7 +3963,8 @@
                             </a:prstClr>
                           </a:outerShdw>
                         </a:effectLst>
-                        <a:latin typeface="+mj-lt"/>
+                        <a:latin typeface="Aharoni" panose="02010803020104030203" pitchFamily="2" charset="-79"/>
+                        <a:cs typeface="Aharoni" panose="02010803020104030203" pitchFamily="2" charset="-79"/>
                       </a:endParaRPr>
                     </a:p>
                     <a:p>
@@ -4070,7 +4076,8 @@
                               <a:lumMod val="50000"/>
                             </a:schemeClr>
                           </a:solidFill>
-                          <a:latin typeface="+mj-lt"/>
+                          <a:latin typeface="Aharoni" panose="02010803020104030203" pitchFamily="2" charset="-79"/>
+                          <a:cs typeface="Aharoni" panose="02010803020104030203" pitchFamily="2" charset="-79"/>
                         </a:rPr>
                         <a:t>Introduction</a:t>
                       </a:r>
@@ -4628,7 +4635,7 @@
                     <a:p>
                       <a:pPr marL="176213" indent="0" algn="l"/>
                       <a:r>
-                        <a:rPr lang="en-CA" sz="3600" b="0" u="none" dirty="0" smtClean="0">
+                        <a:rPr lang="en-CA" sz="4000" b="1" u="none" dirty="0" smtClean="0">
                           <a:ln w="3175">
                             <a:noFill/>
                           </a:ln>
@@ -4829,7 +4836,7 @@
                         <a:buNone/>
                       </a:pPr>
                       <a:r>
-                        <a:rPr lang="en-CA" sz="3600" dirty="0" smtClean="0">
+                        <a:rPr lang="en-CA" sz="4000" b="1" dirty="0" smtClean="0">
                           <a:ln w="3175">
                             <a:noFill/>
                           </a:ln>
@@ -5010,7 +5017,7 @@
                       <a:prstDash val="solid"/>
                     </a:lnBlToTr>
                     <a:solidFill>
-                      <a:srgbClr val="808000">
+                      <a:srgbClr val="CCCC00">
                         <a:alpha val="20000"/>
                       </a:srgbClr>
                     </a:solidFill>
@@ -5032,7 +5039,8 @@
                               <a:lumMod val="50000"/>
                             </a:schemeClr>
                           </a:solidFill>
-                          <a:latin typeface="+mj-lt"/>
+                          <a:latin typeface="Aharoni" panose="02010803020104030203" pitchFamily="2" charset="-79"/>
+                          <a:cs typeface="Aharoni" panose="02010803020104030203" pitchFamily="2" charset="-79"/>
                         </a:rPr>
                         <a:t>Approach</a:t>
                       </a:r>
@@ -5054,7 +5062,7 @@
                     <a:p>
                       <a:pPr algn="l"/>
                       <a:r>
-                        <a:rPr lang="en-CA" sz="3600" b="0" dirty="0" smtClean="0">
+                        <a:rPr lang="en-CA" sz="4000" b="1" dirty="0" smtClean="0">
                           <a:ln w="3175">
                             <a:noFill/>
                           </a:ln>
@@ -5716,7 +5724,7 @@
                       <a:prstDash val="solid"/>
                     </a:lnBlToTr>
                     <a:solidFill>
-                      <a:srgbClr val="808000">
+                      <a:srgbClr val="CCCC00">
                         <a:alpha val="20000"/>
                       </a:srgbClr>
                     </a:solidFill>
@@ -5780,7 +5788,7 @@
                         <a:defRPr/>
                       </a:pPr>
                       <a:r>
-                        <a:rPr kumimoji="0" lang="en-CA" sz="3600" b="0" i="0" u="none" strike="noStrike" kern="1200" cap="none" spc="0" normalizeH="0" baseline="0" noProof="0" dirty="0" smtClean="0">
+                        <a:rPr kumimoji="0" lang="en-CA" sz="4000" b="1" i="0" u="none" strike="noStrike" kern="1200" cap="none" spc="0" normalizeH="0" baseline="0" noProof="0" dirty="0" smtClean="0">
                           <a:ln w="3175">
                             <a:noFill/>
                           </a:ln>
@@ -6150,7 +6158,8 @@
                               <a:lumMod val="50000"/>
                             </a:schemeClr>
                           </a:solidFill>
-                          <a:latin typeface="+mj-lt"/>
+                          <a:latin typeface="Aharoni" panose="02010803020104030203" pitchFamily="2" charset="-79"/>
+                          <a:cs typeface="Aharoni" panose="02010803020104030203" pitchFamily="2" charset="-79"/>
                         </a:rPr>
                         <a:t>Results</a:t>
                       </a:r>
@@ -6158,7 +6167,7 @@
                     <a:p>
                       <a:pPr algn="just"/>
                       <a:r>
-                        <a:rPr lang="en-CA" sz="3600" b="0" dirty="0" smtClean="0">
+                        <a:rPr lang="en-CA" sz="4000" b="1" dirty="0" smtClean="0">
                           <a:ln w="3175">
                             <a:noFill/>
                           </a:ln>
@@ -6247,20 +6256,6 @@
                     </a:p>
                     <a:p>
                       <a:pPr algn="just"/>
-                      <a:endParaRPr lang="en-CA" sz="2400" b="0" baseline="0" dirty="0" smtClean="0">
-                        <a:ln w="3175">
-                          <a:noFill/>
-                        </a:ln>
-                        <a:solidFill>
-                          <a:schemeClr val="accent6">
-                            <a:lumMod val="50000"/>
-                          </a:schemeClr>
-                        </a:solidFill>
-                        <a:latin typeface="+mj-lt"/>
-                      </a:endParaRPr>
-                    </a:p>
-                    <a:p>
-                      <a:pPr algn="just"/>
                       <a:endParaRPr lang="en-CA" sz="800" b="0" baseline="0" dirty="0" smtClean="0">
                         <a:ln w="3175">
                           <a:noFill/>
@@ -6276,7 +6271,7 @@
                     <a:p>
                       <a:pPr algn="just"/>
                       <a:r>
-                        <a:rPr lang="en-CA" sz="3600" b="0" baseline="0" dirty="0" smtClean="0">
+                        <a:rPr lang="en-CA" sz="4000" b="1" baseline="0" dirty="0" smtClean="0">
                           <a:ln w="3175">
                             <a:noFill/>
                           </a:ln>
@@ -6323,7 +6318,7 @@
                     </a:p>
                     <a:p>
                       <a:pPr algn="just"/>
-                      <a:endParaRPr lang="en-CA" sz="2400" b="0" baseline="0" dirty="0" smtClean="0">
+                      <a:endParaRPr lang="en-CA" sz="2000" b="0" baseline="0" dirty="0" smtClean="0">
                         <a:ln w="3175">
                           <a:noFill/>
                         </a:ln>
@@ -6338,7 +6333,7 @@
                     <a:p>
                       <a:pPr algn="just"/>
                       <a:r>
-                        <a:rPr lang="en-CA" sz="3600" b="0" baseline="0" dirty="0" smtClean="0">
+                        <a:rPr lang="en-CA" sz="4000" b="1" baseline="0" dirty="0" smtClean="0">
                           <a:ln w="3175">
                             <a:noFill/>
                           </a:ln>
@@ -6414,7 +6409,7 @@
                         <a:buFont typeface="Wingdings" panose="05000000000000000000" pitchFamily="2" charset="2"/>
                         <a:buChar char="v"/>
                       </a:pPr>
-                      <a:endParaRPr lang="en-CA" sz="2400" b="0" baseline="0" dirty="0" smtClean="0">
+                      <a:endParaRPr lang="en-CA" sz="1800" b="0" baseline="0" dirty="0" smtClean="0">
                         <a:ln w="3175">
                           <a:noFill/>
                         </a:ln>
@@ -6429,7 +6424,7 @@
                     <a:p>
                       <a:pPr algn="just"/>
                       <a:r>
-                        <a:rPr lang="en-CA" sz="3600" b="0" baseline="0" dirty="0" smtClean="0">
+                        <a:rPr lang="en-CA" sz="4000" b="1" baseline="0" dirty="0" smtClean="0">
                           <a:ln w="3175">
                             <a:noFill/>
                           </a:ln>
@@ -6554,7 +6549,7 @@
                       <a:prstDash val="solid"/>
                     </a:lnBlToTr>
                     <a:solidFill>
-                      <a:srgbClr val="808000">
+                      <a:srgbClr val="CCCC00">
                         <a:alpha val="20000"/>
                       </a:srgbClr>
                     </a:solidFill>

</xml_diff>